<commit_message>
add 3D model end update drawings
</commit_message>
<xml_diff>
--- a/presentation.pptx
+++ b/presentation.pptx
@@ -210,7 +210,7 @@
           <a:p>
             <a:fld id="{5A80A561-BE7C-4202-BBF3-BFF8108A49DD}" type="datetimeFigureOut">
               <a:rPr lang="ru-RU" smtClean="0"/>
-              <a:t>07.12.2021</a:t>
+              <a:t>12.12.2021</a:t>
             </a:fld>
             <a:endParaRPr lang="ru-RU"/>
           </a:p>
@@ -584,7 +584,7 @@
           <p:cNvPr id="8" name="Рисунок 7">
             <a:extLst>
               <a:ext uri="{FF2B5EF4-FFF2-40B4-BE49-F238E27FC236}">
-                <a16:creationId xmlns:a16="http://schemas.microsoft.com/office/drawing/2014/main" xmlns="" id="{3CBD4333-8765-4373-994B-B2C4CD30CA8B}"/>
+                <a16:creationId xmlns="" xmlns:a16="http://schemas.microsoft.com/office/drawing/2014/main" id="{3CBD4333-8765-4373-994B-B2C4CD30CA8B}"/>
               </a:ext>
             </a:extLst>
           </p:cNvPr>
@@ -620,7 +620,7 @@
           <p:cNvPr id="2" name="Заголовок 1">
             <a:extLst>
               <a:ext uri="{FF2B5EF4-FFF2-40B4-BE49-F238E27FC236}">
-                <a16:creationId xmlns:a16="http://schemas.microsoft.com/office/drawing/2014/main" xmlns="" id="{1202E359-43A8-4663-B374-AFF6F46EDCED}"/>
+                <a16:creationId xmlns="" xmlns:a16="http://schemas.microsoft.com/office/drawing/2014/main" id="{1202E359-43A8-4663-B374-AFF6F46EDCED}"/>
               </a:ext>
             </a:extLst>
           </p:cNvPr>
@@ -658,7 +658,7 @@
           <p:cNvPr id="3" name="Подзаголовок 2">
             <a:extLst>
               <a:ext uri="{FF2B5EF4-FFF2-40B4-BE49-F238E27FC236}">
-                <a16:creationId xmlns:a16="http://schemas.microsoft.com/office/drawing/2014/main" xmlns="" id="{5F17E991-6BF7-42FB-BD5A-381824A00ABB}"/>
+                <a16:creationId xmlns="" xmlns:a16="http://schemas.microsoft.com/office/drawing/2014/main" id="{5F17E991-6BF7-42FB-BD5A-381824A00ABB}"/>
               </a:ext>
             </a:extLst>
           </p:cNvPr>
@@ -729,7 +729,7 @@
           <p:cNvPr id="4" name="Дата 3">
             <a:extLst>
               <a:ext uri="{FF2B5EF4-FFF2-40B4-BE49-F238E27FC236}">
-                <a16:creationId xmlns:a16="http://schemas.microsoft.com/office/drawing/2014/main" xmlns="" id="{AA2ACFB8-7506-482D-B231-C980C2D8F442}"/>
+                <a16:creationId xmlns="" xmlns:a16="http://schemas.microsoft.com/office/drawing/2014/main" id="{AA2ACFB8-7506-482D-B231-C980C2D8F442}"/>
               </a:ext>
             </a:extLst>
           </p:cNvPr>
@@ -747,7 +747,7 @@
           <a:p>
             <a:fld id="{179F325E-E7A8-4C2D-A5CC-333F2160F8C7}" type="datetimeFigureOut">
               <a:rPr lang="ru-RU" smtClean="0"/>
-              <a:t>07.12.2021</a:t>
+              <a:t>12.12.2021</a:t>
             </a:fld>
             <a:endParaRPr lang="ru-RU"/>
           </a:p>
@@ -758,7 +758,7 @@
           <p:cNvPr id="5" name="Нижний колонтитул 4">
             <a:extLst>
               <a:ext uri="{FF2B5EF4-FFF2-40B4-BE49-F238E27FC236}">
-                <a16:creationId xmlns:a16="http://schemas.microsoft.com/office/drawing/2014/main" xmlns="" id="{4AC199F4-016C-452B-B92B-FD7594D64FBC}"/>
+                <a16:creationId xmlns="" xmlns:a16="http://schemas.microsoft.com/office/drawing/2014/main" id="{4AC199F4-016C-452B-B92B-FD7594D64FBC}"/>
               </a:ext>
             </a:extLst>
           </p:cNvPr>
@@ -783,7 +783,7 @@
           <p:cNvPr id="6" name="Номер слайда 5">
             <a:extLst>
               <a:ext uri="{FF2B5EF4-FFF2-40B4-BE49-F238E27FC236}">
-                <a16:creationId xmlns:a16="http://schemas.microsoft.com/office/drawing/2014/main" xmlns="" id="{F234184A-E97B-4C44-A738-C6808DD2D52D}"/>
+                <a16:creationId xmlns="" xmlns:a16="http://schemas.microsoft.com/office/drawing/2014/main" id="{F234184A-E97B-4C44-A738-C6808DD2D52D}"/>
               </a:ext>
             </a:extLst>
           </p:cNvPr>
@@ -842,7 +842,7 @@
           <p:cNvPr id="2" name="Заголовок 1">
             <a:extLst>
               <a:ext uri="{FF2B5EF4-FFF2-40B4-BE49-F238E27FC236}">
-                <a16:creationId xmlns:a16="http://schemas.microsoft.com/office/drawing/2014/main" xmlns="" id="{83F1E52A-445B-4003-8330-C9C1F8D14313}"/>
+                <a16:creationId xmlns="" xmlns:a16="http://schemas.microsoft.com/office/drawing/2014/main" id="{83F1E52A-445B-4003-8330-C9C1F8D14313}"/>
               </a:ext>
             </a:extLst>
           </p:cNvPr>
@@ -871,7 +871,7 @@
           <p:cNvPr id="3" name="Вертикальный текст 2">
             <a:extLst>
               <a:ext uri="{FF2B5EF4-FFF2-40B4-BE49-F238E27FC236}">
-                <a16:creationId xmlns:a16="http://schemas.microsoft.com/office/drawing/2014/main" xmlns="" id="{16384515-B604-4B81-958B-46C790F03C1C}"/>
+                <a16:creationId xmlns="" xmlns:a16="http://schemas.microsoft.com/office/drawing/2014/main" id="{16384515-B604-4B81-958B-46C790F03C1C}"/>
               </a:ext>
             </a:extLst>
           </p:cNvPr>
@@ -929,7 +929,7 @@
           <p:cNvPr id="4" name="Дата 3">
             <a:extLst>
               <a:ext uri="{FF2B5EF4-FFF2-40B4-BE49-F238E27FC236}">
-                <a16:creationId xmlns:a16="http://schemas.microsoft.com/office/drawing/2014/main" xmlns="" id="{99575CF8-AA8A-4D65-81AB-92AA624C8F59}"/>
+                <a16:creationId xmlns="" xmlns:a16="http://schemas.microsoft.com/office/drawing/2014/main" id="{99575CF8-AA8A-4D65-81AB-92AA624C8F59}"/>
               </a:ext>
             </a:extLst>
           </p:cNvPr>
@@ -947,7 +947,7 @@
           <a:p>
             <a:fld id="{179F325E-E7A8-4C2D-A5CC-333F2160F8C7}" type="datetimeFigureOut">
               <a:rPr lang="ru-RU" smtClean="0"/>
-              <a:t>07.12.2021</a:t>
+              <a:t>12.12.2021</a:t>
             </a:fld>
             <a:endParaRPr lang="ru-RU"/>
           </a:p>
@@ -958,7 +958,7 @@
           <p:cNvPr id="5" name="Нижний колонтитул 4">
             <a:extLst>
               <a:ext uri="{FF2B5EF4-FFF2-40B4-BE49-F238E27FC236}">
-                <a16:creationId xmlns:a16="http://schemas.microsoft.com/office/drawing/2014/main" xmlns="" id="{D10C2321-D046-43DC-822E-2B925CBA5683}"/>
+                <a16:creationId xmlns="" xmlns:a16="http://schemas.microsoft.com/office/drawing/2014/main" id="{D10C2321-D046-43DC-822E-2B925CBA5683}"/>
               </a:ext>
             </a:extLst>
           </p:cNvPr>
@@ -983,7 +983,7 @@
           <p:cNvPr id="6" name="Номер слайда 5">
             <a:extLst>
               <a:ext uri="{FF2B5EF4-FFF2-40B4-BE49-F238E27FC236}">
-                <a16:creationId xmlns:a16="http://schemas.microsoft.com/office/drawing/2014/main" xmlns="" id="{E1DF8C07-8301-4549-A144-486E743A5E06}"/>
+                <a16:creationId xmlns="" xmlns:a16="http://schemas.microsoft.com/office/drawing/2014/main" id="{E1DF8C07-8301-4549-A144-486E743A5E06}"/>
               </a:ext>
             </a:extLst>
           </p:cNvPr>
@@ -1042,7 +1042,7 @@
           <p:cNvPr id="2" name="Вертикальный заголовок 1">
             <a:extLst>
               <a:ext uri="{FF2B5EF4-FFF2-40B4-BE49-F238E27FC236}">
-                <a16:creationId xmlns:a16="http://schemas.microsoft.com/office/drawing/2014/main" xmlns="" id="{D57117D0-51FF-462F-87A5-8F763DB29BAC}"/>
+                <a16:creationId xmlns="" xmlns:a16="http://schemas.microsoft.com/office/drawing/2014/main" id="{D57117D0-51FF-462F-87A5-8F763DB29BAC}"/>
               </a:ext>
             </a:extLst>
           </p:cNvPr>
@@ -1076,7 +1076,7 @@
           <p:cNvPr id="3" name="Вертикальный текст 2">
             <a:extLst>
               <a:ext uri="{FF2B5EF4-FFF2-40B4-BE49-F238E27FC236}">
-                <a16:creationId xmlns:a16="http://schemas.microsoft.com/office/drawing/2014/main" xmlns="" id="{31F9D19D-DDD9-442E-A974-5F562456FF41}"/>
+                <a16:creationId xmlns="" xmlns:a16="http://schemas.microsoft.com/office/drawing/2014/main" id="{31F9D19D-DDD9-442E-A974-5F562456FF41}"/>
               </a:ext>
             </a:extLst>
           </p:cNvPr>
@@ -1139,7 +1139,7 @@
           <p:cNvPr id="4" name="Дата 3">
             <a:extLst>
               <a:ext uri="{FF2B5EF4-FFF2-40B4-BE49-F238E27FC236}">
-                <a16:creationId xmlns:a16="http://schemas.microsoft.com/office/drawing/2014/main" xmlns="" id="{2D332ADB-FF6B-4182-A33F-F14AA33DE477}"/>
+                <a16:creationId xmlns="" xmlns:a16="http://schemas.microsoft.com/office/drawing/2014/main" id="{2D332ADB-FF6B-4182-A33F-F14AA33DE477}"/>
               </a:ext>
             </a:extLst>
           </p:cNvPr>
@@ -1157,7 +1157,7 @@
           <a:p>
             <a:fld id="{179F325E-E7A8-4C2D-A5CC-333F2160F8C7}" type="datetimeFigureOut">
               <a:rPr lang="ru-RU" smtClean="0"/>
-              <a:t>07.12.2021</a:t>
+              <a:t>12.12.2021</a:t>
             </a:fld>
             <a:endParaRPr lang="ru-RU"/>
           </a:p>
@@ -1168,7 +1168,7 @@
           <p:cNvPr id="5" name="Нижний колонтитул 4">
             <a:extLst>
               <a:ext uri="{FF2B5EF4-FFF2-40B4-BE49-F238E27FC236}">
-                <a16:creationId xmlns:a16="http://schemas.microsoft.com/office/drawing/2014/main" xmlns="" id="{4DC536EC-5EE7-4A1D-AB65-56333D74EACC}"/>
+                <a16:creationId xmlns="" xmlns:a16="http://schemas.microsoft.com/office/drawing/2014/main" id="{4DC536EC-5EE7-4A1D-AB65-56333D74EACC}"/>
               </a:ext>
             </a:extLst>
           </p:cNvPr>
@@ -1193,7 +1193,7 @@
           <p:cNvPr id="6" name="Номер слайда 5">
             <a:extLst>
               <a:ext uri="{FF2B5EF4-FFF2-40B4-BE49-F238E27FC236}">
-                <a16:creationId xmlns:a16="http://schemas.microsoft.com/office/drawing/2014/main" xmlns="" id="{12528C87-E0CC-4401-80B2-1A5FE0BC3509}"/>
+                <a16:creationId xmlns="" xmlns:a16="http://schemas.microsoft.com/office/drawing/2014/main" id="{12528C87-E0CC-4401-80B2-1A5FE0BC3509}"/>
               </a:ext>
             </a:extLst>
           </p:cNvPr>
@@ -1252,7 +1252,7 @@
           <p:cNvPr id="2" name="Заголовок 1">
             <a:extLst>
               <a:ext uri="{FF2B5EF4-FFF2-40B4-BE49-F238E27FC236}">
-                <a16:creationId xmlns:a16="http://schemas.microsoft.com/office/drawing/2014/main" xmlns="" id="{36E1CE25-4CC8-4524-BC78-945C03B81B67}"/>
+                <a16:creationId xmlns="" xmlns:a16="http://schemas.microsoft.com/office/drawing/2014/main" id="{36E1CE25-4CC8-4524-BC78-945C03B81B67}"/>
               </a:ext>
             </a:extLst>
           </p:cNvPr>
@@ -1281,7 +1281,7 @@
           <p:cNvPr id="3" name="Объект 2">
             <a:extLst>
               <a:ext uri="{FF2B5EF4-FFF2-40B4-BE49-F238E27FC236}">
-                <a16:creationId xmlns:a16="http://schemas.microsoft.com/office/drawing/2014/main" xmlns="" id="{8A62EFDD-9C97-4DFA-B7EF-AA3097E58572}"/>
+                <a16:creationId xmlns="" xmlns:a16="http://schemas.microsoft.com/office/drawing/2014/main" id="{8A62EFDD-9C97-4DFA-B7EF-AA3097E58572}"/>
               </a:ext>
             </a:extLst>
           </p:cNvPr>
@@ -1339,7 +1339,7 @@
           <p:cNvPr id="4" name="Дата 3">
             <a:extLst>
               <a:ext uri="{FF2B5EF4-FFF2-40B4-BE49-F238E27FC236}">
-                <a16:creationId xmlns:a16="http://schemas.microsoft.com/office/drawing/2014/main" xmlns="" id="{2211039C-F79B-42AD-9BEE-8CAB91121368}"/>
+                <a16:creationId xmlns="" xmlns:a16="http://schemas.microsoft.com/office/drawing/2014/main" id="{2211039C-F79B-42AD-9BEE-8CAB91121368}"/>
               </a:ext>
             </a:extLst>
           </p:cNvPr>
@@ -1357,7 +1357,7 @@
           <a:p>
             <a:fld id="{179F325E-E7A8-4C2D-A5CC-333F2160F8C7}" type="datetimeFigureOut">
               <a:rPr lang="ru-RU" smtClean="0"/>
-              <a:t>07.12.2021</a:t>
+              <a:t>12.12.2021</a:t>
             </a:fld>
             <a:endParaRPr lang="ru-RU"/>
           </a:p>
@@ -1368,7 +1368,7 @@
           <p:cNvPr id="5" name="Нижний колонтитул 4">
             <a:extLst>
               <a:ext uri="{FF2B5EF4-FFF2-40B4-BE49-F238E27FC236}">
-                <a16:creationId xmlns:a16="http://schemas.microsoft.com/office/drawing/2014/main" xmlns="" id="{A35B3BBB-379E-452D-98B8-D8F092976872}"/>
+                <a16:creationId xmlns="" xmlns:a16="http://schemas.microsoft.com/office/drawing/2014/main" id="{A35B3BBB-379E-452D-98B8-D8F092976872}"/>
               </a:ext>
             </a:extLst>
           </p:cNvPr>
@@ -1393,7 +1393,7 @@
           <p:cNvPr id="6" name="Номер слайда 5">
             <a:extLst>
               <a:ext uri="{FF2B5EF4-FFF2-40B4-BE49-F238E27FC236}">
-                <a16:creationId xmlns:a16="http://schemas.microsoft.com/office/drawing/2014/main" xmlns="" id="{FEB9BBEE-97C2-4DE1-9006-388B69B184F1}"/>
+                <a16:creationId xmlns="" xmlns:a16="http://schemas.microsoft.com/office/drawing/2014/main" id="{FEB9BBEE-97C2-4DE1-9006-388B69B184F1}"/>
               </a:ext>
             </a:extLst>
           </p:cNvPr>
@@ -1452,7 +1452,7 @@
           <p:cNvPr id="2" name="Заголовок 1">
             <a:extLst>
               <a:ext uri="{FF2B5EF4-FFF2-40B4-BE49-F238E27FC236}">
-                <a16:creationId xmlns:a16="http://schemas.microsoft.com/office/drawing/2014/main" xmlns="" id="{BCD1288A-C689-4F3C-A5D6-7DFC82AEC2D0}"/>
+                <a16:creationId xmlns="" xmlns:a16="http://schemas.microsoft.com/office/drawing/2014/main" id="{BCD1288A-C689-4F3C-A5D6-7DFC82AEC2D0}"/>
               </a:ext>
             </a:extLst>
           </p:cNvPr>
@@ -1490,7 +1490,7 @@
           <p:cNvPr id="3" name="Текст 2">
             <a:extLst>
               <a:ext uri="{FF2B5EF4-FFF2-40B4-BE49-F238E27FC236}">
-                <a16:creationId xmlns:a16="http://schemas.microsoft.com/office/drawing/2014/main" xmlns="" id="{201F03C4-D983-4605-8DDC-22969BB07055}"/>
+                <a16:creationId xmlns="" xmlns:a16="http://schemas.microsoft.com/office/drawing/2014/main" id="{201F03C4-D983-4605-8DDC-22969BB07055}"/>
               </a:ext>
             </a:extLst>
           </p:cNvPr>
@@ -1615,7 +1615,7 @@
           <p:cNvPr id="4" name="Дата 3">
             <a:extLst>
               <a:ext uri="{FF2B5EF4-FFF2-40B4-BE49-F238E27FC236}">
-                <a16:creationId xmlns:a16="http://schemas.microsoft.com/office/drawing/2014/main" xmlns="" id="{502F1836-FDAE-4D30-9F24-CA0C31656DA9}"/>
+                <a16:creationId xmlns="" xmlns:a16="http://schemas.microsoft.com/office/drawing/2014/main" id="{502F1836-FDAE-4D30-9F24-CA0C31656DA9}"/>
               </a:ext>
             </a:extLst>
           </p:cNvPr>
@@ -1633,7 +1633,7 @@
           <a:p>
             <a:fld id="{179F325E-E7A8-4C2D-A5CC-333F2160F8C7}" type="datetimeFigureOut">
               <a:rPr lang="ru-RU" smtClean="0"/>
-              <a:t>07.12.2021</a:t>
+              <a:t>12.12.2021</a:t>
             </a:fld>
             <a:endParaRPr lang="ru-RU"/>
           </a:p>
@@ -1644,7 +1644,7 @@
           <p:cNvPr id="5" name="Нижний колонтитул 4">
             <a:extLst>
               <a:ext uri="{FF2B5EF4-FFF2-40B4-BE49-F238E27FC236}">
-                <a16:creationId xmlns:a16="http://schemas.microsoft.com/office/drawing/2014/main" xmlns="" id="{D2B648A3-3C2E-4580-86E1-FF7C49CF33B3}"/>
+                <a16:creationId xmlns="" xmlns:a16="http://schemas.microsoft.com/office/drawing/2014/main" id="{D2B648A3-3C2E-4580-86E1-FF7C49CF33B3}"/>
               </a:ext>
             </a:extLst>
           </p:cNvPr>
@@ -1669,7 +1669,7 @@
           <p:cNvPr id="6" name="Номер слайда 5">
             <a:extLst>
               <a:ext uri="{FF2B5EF4-FFF2-40B4-BE49-F238E27FC236}">
-                <a16:creationId xmlns:a16="http://schemas.microsoft.com/office/drawing/2014/main" xmlns="" id="{9198BB75-5A23-4C9E-A6FC-F0D5409014E7}"/>
+                <a16:creationId xmlns="" xmlns:a16="http://schemas.microsoft.com/office/drawing/2014/main" id="{9198BB75-5A23-4C9E-A6FC-F0D5409014E7}"/>
               </a:ext>
             </a:extLst>
           </p:cNvPr>
@@ -1728,7 +1728,7 @@
           <p:cNvPr id="2" name="Заголовок 1">
             <a:extLst>
               <a:ext uri="{FF2B5EF4-FFF2-40B4-BE49-F238E27FC236}">
-                <a16:creationId xmlns:a16="http://schemas.microsoft.com/office/drawing/2014/main" xmlns="" id="{D90E8138-14BB-479F-8605-6229E0BBB09D}"/>
+                <a16:creationId xmlns="" xmlns:a16="http://schemas.microsoft.com/office/drawing/2014/main" id="{D90E8138-14BB-479F-8605-6229E0BBB09D}"/>
               </a:ext>
             </a:extLst>
           </p:cNvPr>
@@ -1757,7 +1757,7 @@
           <p:cNvPr id="3" name="Объект 2">
             <a:extLst>
               <a:ext uri="{FF2B5EF4-FFF2-40B4-BE49-F238E27FC236}">
-                <a16:creationId xmlns:a16="http://schemas.microsoft.com/office/drawing/2014/main" xmlns="" id="{8C12C7E9-342B-4821-B80C-A1735E154F6E}"/>
+                <a16:creationId xmlns="" xmlns:a16="http://schemas.microsoft.com/office/drawing/2014/main" id="{8C12C7E9-342B-4821-B80C-A1735E154F6E}"/>
               </a:ext>
             </a:extLst>
           </p:cNvPr>
@@ -1820,7 +1820,7 @@
           <p:cNvPr id="4" name="Объект 3">
             <a:extLst>
               <a:ext uri="{FF2B5EF4-FFF2-40B4-BE49-F238E27FC236}">
-                <a16:creationId xmlns:a16="http://schemas.microsoft.com/office/drawing/2014/main" xmlns="" id="{2A929AAF-2AEE-463F-87B7-30D4C837A31B}"/>
+                <a16:creationId xmlns="" xmlns:a16="http://schemas.microsoft.com/office/drawing/2014/main" id="{2A929AAF-2AEE-463F-87B7-30D4C837A31B}"/>
               </a:ext>
             </a:extLst>
           </p:cNvPr>
@@ -1883,7 +1883,7 @@
           <p:cNvPr id="5" name="Дата 4">
             <a:extLst>
               <a:ext uri="{FF2B5EF4-FFF2-40B4-BE49-F238E27FC236}">
-                <a16:creationId xmlns:a16="http://schemas.microsoft.com/office/drawing/2014/main" xmlns="" id="{4844FC70-6B0C-4C37-9243-D068CA353FBC}"/>
+                <a16:creationId xmlns="" xmlns:a16="http://schemas.microsoft.com/office/drawing/2014/main" id="{4844FC70-6B0C-4C37-9243-D068CA353FBC}"/>
               </a:ext>
             </a:extLst>
           </p:cNvPr>
@@ -1901,7 +1901,7 @@
           <a:p>
             <a:fld id="{179F325E-E7A8-4C2D-A5CC-333F2160F8C7}" type="datetimeFigureOut">
               <a:rPr lang="ru-RU" smtClean="0"/>
-              <a:t>07.12.2021</a:t>
+              <a:t>12.12.2021</a:t>
             </a:fld>
             <a:endParaRPr lang="ru-RU"/>
           </a:p>
@@ -1912,7 +1912,7 @@
           <p:cNvPr id="6" name="Нижний колонтитул 5">
             <a:extLst>
               <a:ext uri="{FF2B5EF4-FFF2-40B4-BE49-F238E27FC236}">
-                <a16:creationId xmlns:a16="http://schemas.microsoft.com/office/drawing/2014/main" xmlns="" id="{264D70FB-2759-4EF1-A94D-A626DEB0DCC8}"/>
+                <a16:creationId xmlns="" xmlns:a16="http://schemas.microsoft.com/office/drawing/2014/main" id="{264D70FB-2759-4EF1-A94D-A626DEB0DCC8}"/>
               </a:ext>
             </a:extLst>
           </p:cNvPr>
@@ -1937,7 +1937,7 @@
           <p:cNvPr id="7" name="Номер слайда 6">
             <a:extLst>
               <a:ext uri="{FF2B5EF4-FFF2-40B4-BE49-F238E27FC236}">
-                <a16:creationId xmlns:a16="http://schemas.microsoft.com/office/drawing/2014/main" xmlns="" id="{3715A50F-847C-4446-9B00-F674A888C16F}"/>
+                <a16:creationId xmlns="" xmlns:a16="http://schemas.microsoft.com/office/drawing/2014/main" id="{3715A50F-847C-4446-9B00-F674A888C16F}"/>
               </a:ext>
             </a:extLst>
           </p:cNvPr>
@@ -1996,7 +1996,7 @@
           <p:cNvPr id="2" name="Заголовок 1">
             <a:extLst>
               <a:ext uri="{FF2B5EF4-FFF2-40B4-BE49-F238E27FC236}">
-                <a16:creationId xmlns:a16="http://schemas.microsoft.com/office/drawing/2014/main" xmlns="" id="{C3AC5604-E9BD-4F6E-9BF9-7530919B208C}"/>
+                <a16:creationId xmlns="" xmlns:a16="http://schemas.microsoft.com/office/drawing/2014/main" id="{C3AC5604-E9BD-4F6E-9BF9-7530919B208C}"/>
               </a:ext>
             </a:extLst>
           </p:cNvPr>
@@ -2030,7 +2030,7 @@
           <p:cNvPr id="3" name="Текст 2">
             <a:extLst>
               <a:ext uri="{FF2B5EF4-FFF2-40B4-BE49-F238E27FC236}">
-                <a16:creationId xmlns:a16="http://schemas.microsoft.com/office/drawing/2014/main" xmlns="" id="{115D398E-C1B1-4ABE-B800-2CB4B42C8941}"/>
+                <a16:creationId xmlns="" xmlns:a16="http://schemas.microsoft.com/office/drawing/2014/main" id="{115D398E-C1B1-4ABE-B800-2CB4B42C8941}"/>
               </a:ext>
             </a:extLst>
           </p:cNvPr>
@@ -2101,7 +2101,7 @@
           <p:cNvPr id="4" name="Объект 3">
             <a:extLst>
               <a:ext uri="{FF2B5EF4-FFF2-40B4-BE49-F238E27FC236}">
-                <a16:creationId xmlns:a16="http://schemas.microsoft.com/office/drawing/2014/main" xmlns="" id="{EA75FA8E-4762-45B3-AAA3-EF59D8E88F95}"/>
+                <a16:creationId xmlns="" xmlns:a16="http://schemas.microsoft.com/office/drawing/2014/main" id="{EA75FA8E-4762-45B3-AAA3-EF59D8E88F95}"/>
               </a:ext>
             </a:extLst>
           </p:cNvPr>
@@ -2164,7 +2164,7 @@
           <p:cNvPr id="5" name="Текст 4">
             <a:extLst>
               <a:ext uri="{FF2B5EF4-FFF2-40B4-BE49-F238E27FC236}">
-                <a16:creationId xmlns:a16="http://schemas.microsoft.com/office/drawing/2014/main" xmlns="" id="{A1BC3476-8D2B-4747-A6DA-4E52D434E982}"/>
+                <a16:creationId xmlns="" xmlns:a16="http://schemas.microsoft.com/office/drawing/2014/main" id="{A1BC3476-8D2B-4747-A6DA-4E52D434E982}"/>
               </a:ext>
             </a:extLst>
           </p:cNvPr>
@@ -2235,7 +2235,7 @@
           <p:cNvPr id="6" name="Объект 5">
             <a:extLst>
               <a:ext uri="{FF2B5EF4-FFF2-40B4-BE49-F238E27FC236}">
-                <a16:creationId xmlns:a16="http://schemas.microsoft.com/office/drawing/2014/main" xmlns="" id="{4A3CD930-E2D9-45CB-9825-F84B23C72674}"/>
+                <a16:creationId xmlns="" xmlns:a16="http://schemas.microsoft.com/office/drawing/2014/main" id="{4A3CD930-E2D9-45CB-9825-F84B23C72674}"/>
               </a:ext>
             </a:extLst>
           </p:cNvPr>
@@ -2298,7 +2298,7 @@
           <p:cNvPr id="7" name="Дата 6">
             <a:extLst>
               <a:ext uri="{FF2B5EF4-FFF2-40B4-BE49-F238E27FC236}">
-                <a16:creationId xmlns:a16="http://schemas.microsoft.com/office/drawing/2014/main" xmlns="" id="{51AF7561-EABF-431C-A944-66AF5BB686B8}"/>
+                <a16:creationId xmlns="" xmlns:a16="http://schemas.microsoft.com/office/drawing/2014/main" id="{51AF7561-EABF-431C-A944-66AF5BB686B8}"/>
               </a:ext>
             </a:extLst>
           </p:cNvPr>
@@ -2316,7 +2316,7 @@
           <a:p>
             <a:fld id="{179F325E-E7A8-4C2D-A5CC-333F2160F8C7}" type="datetimeFigureOut">
               <a:rPr lang="ru-RU" smtClean="0"/>
-              <a:t>07.12.2021</a:t>
+              <a:t>12.12.2021</a:t>
             </a:fld>
             <a:endParaRPr lang="ru-RU"/>
           </a:p>
@@ -2327,7 +2327,7 @@
           <p:cNvPr id="8" name="Нижний колонтитул 7">
             <a:extLst>
               <a:ext uri="{FF2B5EF4-FFF2-40B4-BE49-F238E27FC236}">
-                <a16:creationId xmlns:a16="http://schemas.microsoft.com/office/drawing/2014/main" xmlns="" id="{563B115A-3794-4F0E-A7BC-357B63B72823}"/>
+                <a16:creationId xmlns="" xmlns:a16="http://schemas.microsoft.com/office/drawing/2014/main" id="{563B115A-3794-4F0E-A7BC-357B63B72823}"/>
               </a:ext>
             </a:extLst>
           </p:cNvPr>
@@ -2352,7 +2352,7 @@
           <p:cNvPr id="9" name="Номер слайда 8">
             <a:extLst>
               <a:ext uri="{FF2B5EF4-FFF2-40B4-BE49-F238E27FC236}">
-                <a16:creationId xmlns:a16="http://schemas.microsoft.com/office/drawing/2014/main" xmlns="" id="{28DC624C-5A8D-47E2-99D3-1B8ADAA81DA1}"/>
+                <a16:creationId xmlns="" xmlns:a16="http://schemas.microsoft.com/office/drawing/2014/main" id="{28DC624C-5A8D-47E2-99D3-1B8ADAA81DA1}"/>
               </a:ext>
             </a:extLst>
           </p:cNvPr>
@@ -2411,7 +2411,7 @@
           <p:cNvPr id="2" name="Заголовок 1">
             <a:extLst>
               <a:ext uri="{FF2B5EF4-FFF2-40B4-BE49-F238E27FC236}">
-                <a16:creationId xmlns:a16="http://schemas.microsoft.com/office/drawing/2014/main" xmlns="" id="{A7282B8A-6393-4839-911C-43F299D5E9B4}"/>
+                <a16:creationId xmlns="" xmlns:a16="http://schemas.microsoft.com/office/drawing/2014/main" id="{A7282B8A-6393-4839-911C-43F299D5E9B4}"/>
               </a:ext>
             </a:extLst>
           </p:cNvPr>
@@ -2440,7 +2440,7 @@
           <p:cNvPr id="3" name="Дата 2">
             <a:extLst>
               <a:ext uri="{FF2B5EF4-FFF2-40B4-BE49-F238E27FC236}">
-                <a16:creationId xmlns:a16="http://schemas.microsoft.com/office/drawing/2014/main" xmlns="" id="{D532EC08-A86C-43AF-8549-E8558FB44FC8}"/>
+                <a16:creationId xmlns="" xmlns:a16="http://schemas.microsoft.com/office/drawing/2014/main" id="{D532EC08-A86C-43AF-8549-E8558FB44FC8}"/>
               </a:ext>
             </a:extLst>
           </p:cNvPr>
@@ -2458,7 +2458,7 @@
           <a:p>
             <a:fld id="{179F325E-E7A8-4C2D-A5CC-333F2160F8C7}" type="datetimeFigureOut">
               <a:rPr lang="ru-RU" smtClean="0"/>
-              <a:t>07.12.2021</a:t>
+              <a:t>12.12.2021</a:t>
             </a:fld>
             <a:endParaRPr lang="ru-RU"/>
           </a:p>
@@ -2469,7 +2469,7 @@
           <p:cNvPr id="4" name="Нижний колонтитул 3">
             <a:extLst>
               <a:ext uri="{FF2B5EF4-FFF2-40B4-BE49-F238E27FC236}">
-                <a16:creationId xmlns:a16="http://schemas.microsoft.com/office/drawing/2014/main" xmlns="" id="{1E06BBC2-C32C-4CC3-8AC2-FAA8B526BE9C}"/>
+                <a16:creationId xmlns="" xmlns:a16="http://schemas.microsoft.com/office/drawing/2014/main" id="{1E06BBC2-C32C-4CC3-8AC2-FAA8B526BE9C}"/>
               </a:ext>
             </a:extLst>
           </p:cNvPr>
@@ -2494,7 +2494,7 @@
           <p:cNvPr id="5" name="Номер слайда 4">
             <a:extLst>
               <a:ext uri="{FF2B5EF4-FFF2-40B4-BE49-F238E27FC236}">
-                <a16:creationId xmlns:a16="http://schemas.microsoft.com/office/drawing/2014/main" xmlns="" id="{5E288163-F7B8-45C6-B5DC-795CA5FAA958}"/>
+                <a16:creationId xmlns="" xmlns:a16="http://schemas.microsoft.com/office/drawing/2014/main" id="{5E288163-F7B8-45C6-B5DC-795CA5FAA958}"/>
               </a:ext>
             </a:extLst>
           </p:cNvPr>
@@ -2553,7 +2553,7 @@
           <p:cNvPr id="2" name="Дата 1">
             <a:extLst>
               <a:ext uri="{FF2B5EF4-FFF2-40B4-BE49-F238E27FC236}">
-                <a16:creationId xmlns:a16="http://schemas.microsoft.com/office/drawing/2014/main" xmlns="" id="{43CBDD11-2CE3-4DBE-ABA9-CF73E3431AD4}"/>
+                <a16:creationId xmlns="" xmlns:a16="http://schemas.microsoft.com/office/drawing/2014/main" id="{43CBDD11-2CE3-4DBE-ABA9-CF73E3431AD4}"/>
               </a:ext>
             </a:extLst>
           </p:cNvPr>
@@ -2571,7 +2571,7 @@
           <a:p>
             <a:fld id="{179F325E-E7A8-4C2D-A5CC-333F2160F8C7}" type="datetimeFigureOut">
               <a:rPr lang="ru-RU" smtClean="0"/>
-              <a:t>07.12.2021</a:t>
+              <a:t>12.12.2021</a:t>
             </a:fld>
             <a:endParaRPr lang="ru-RU"/>
           </a:p>
@@ -2582,7 +2582,7 @@
           <p:cNvPr id="3" name="Нижний колонтитул 2">
             <a:extLst>
               <a:ext uri="{FF2B5EF4-FFF2-40B4-BE49-F238E27FC236}">
-                <a16:creationId xmlns:a16="http://schemas.microsoft.com/office/drawing/2014/main" xmlns="" id="{631AB9AE-55CF-47DB-9199-08CD7E4C8971}"/>
+                <a16:creationId xmlns="" xmlns:a16="http://schemas.microsoft.com/office/drawing/2014/main" id="{631AB9AE-55CF-47DB-9199-08CD7E4C8971}"/>
               </a:ext>
             </a:extLst>
           </p:cNvPr>
@@ -2607,7 +2607,7 @@
           <p:cNvPr id="4" name="Номер слайда 3">
             <a:extLst>
               <a:ext uri="{FF2B5EF4-FFF2-40B4-BE49-F238E27FC236}">
-                <a16:creationId xmlns:a16="http://schemas.microsoft.com/office/drawing/2014/main" xmlns="" id="{D59D9D63-08B9-457F-B339-7BA8E4898679}"/>
+                <a16:creationId xmlns="" xmlns:a16="http://schemas.microsoft.com/office/drawing/2014/main" id="{D59D9D63-08B9-457F-B339-7BA8E4898679}"/>
               </a:ext>
             </a:extLst>
           </p:cNvPr>
@@ -2666,7 +2666,7 @@
           <p:cNvPr id="2" name="Заголовок 1">
             <a:extLst>
               <a:ext uri="{FF2B5EF4-FFF2-40B4-BE49-F238E27FC236}">
-                <a16:creationId xmlns:a16="http://schemas.microsoft.com/office/drawing/2014/main" xmlns="" id="{E3A89639-1F31-423A-BEA4-025341FE3428}"/>
+                <a16:creationId xmlns="" xmlns:a16="http://schemas.microsoft.com/office/drawing/2014/main" id="{E3A89639-1F31-423A-BEA4-025341FE3428}"/>
               </a:ext>
             </a:extLst>
           </p:cNvPr>
@@ -2704,7 +2704,7 @@
           <p:cNvPr id="3" name="Объект 2">
             <a:extLst>
               <a:ext uri="{FF2B5EF4-FFF2-40B4-BE49-F238E27FC236}">
-                <a16:creationId xmlns:a16="http://schemas.microsoft.com/office/drawing/2014/main" xmlns="" id="{AC5936EB-4833-428D-9D0D-85E67C5BDD77}"/>
+                <a16:creationId xmlns="" xmlns:a16="http://schemas.microsoft.com/office/drawing/2014/main" id="{AC5936EB-4833-428D-9D0D-85E67C5BDD77}"/>
               </a:ext>
             </a:extLst>
           </p:cNvPr>
@@ -2795,7 +2795,7 @@
           <p:cNvPr id="4" name="Текст 3">
             <a:extLst>
               <a:ext uri="{FF2B5EF4-FFF2-40B4-BE49-F238E27FC236}">
-                <a16:creationId xmlns:a16="http://schemas.microsoft.com/office/drawing/2014/main" xmlns="" id="{024EE994-AAE4-4140-BEBC-A18F27FB514C}"/>
+                <a16:creationId xmlns="" xmlns:a16="http://schemas.microsoft.com/office/drawing/2014/main" id="{024EE994-AAE4-4140-BEBC-A18F27FB514C}"/>
               </a:ext>
             </a:extLst>
           </p:cNvPr>
@@ -2866,7 +2866,7 @@
           <p:cNvPr id="5" name="Дата 4">
             <a:extLst>
               <a:ext uri="{FF2B5EF4-FFF2-40B4-BE49-F238E27FC236}">
-                <a16:creationId xmlns:a16="http://schemas.microsoft.com/office/drawing/2014/main" xmlns="" id="{64F5E72C-0030-4918-BE76-309E94441FD3}"/>
+                <a16:creationId xmlns="" xmlns:a16="http://schemas.microsoft.com/office/drawing/2014/main" id="{64F5E72C-0030-4918-BE76-309E94441FD3}"/>
               </a:ext>
             </a:extLst>
           </p:cNvPr>
@@ -2884,7 +2884,7 @@
           <a:p>
             <a:fld id="{179F325E-E7A8-4C2D-A5CC-333F2160F8C7}" type="datetimeFigureOut">
               <a:rPr lang="ru-RU" smtClean="0"/>
-              <a:t>07.12.2021</a:t>
+              <a:t>12.12.2021</a:t>
             </a:fld>
             <a:endParaRPr lang="ru-RU"/>
           </a:p>
@@ -2895,7 +2895,7 @@
           <p:cNvPr id="6" name="Нижний колонтитул 5">
             <a:extLst>
               <a:ext uri="{FF2B5EF4-FFF2-40B4-BE49-F238E27FC236}">
-                <a16:creationId xmlns:a16="http://schemas.microsoft.com/office/drawing/2014/main" xmlns="" id="{A8DB6F35-947F-412D-9DEB-BCCDDC9A39F1}"/>
+                <a16:creationId xmlns="" xmlns:a16="http://schemas.microsoft.com/office/drawing/2014/main" id="{A8DB6F35-947F-412D-9DEB-BCCDDC9A39F1}"/>
               </a:ext>
             </a:extLst>
           </p:cNvPr>
@@ -2920,7 +2920,7 @@
           <p:cNvPr id="7" name="Номер слайда 6">
             <a:extLst>
               <a:ext uri="{FF2B5EF4-FFF2-40B4-BE49-F238E27FC236}">
-                <a16:creationId xmlns:a16="http://schemas.microsoft.com/office/drawing/2014/main" xmlns="" id="{31541BDB-D5E8-4538-8253-C81DEFC93827}"/>
+                <a16:creationId xmlns="" xmlns:a16="http://schemas.microsoft.com/office/drawing/2014/main" id="{31541BDB-D5E8-4538-8253-C81DEFC93827}"/>
               </a:ext>
             </a:extLst>
           </p:cNvPr>
@@ -2979,7 +2979,7 @@
           <p:cNvPr id="2" name="Заголовок 1">
             <a:extLst>
               <a:ext uri="{FF2B5EF4-FFF2-40B4-BE49-F238E27FC236}">
-                <a16:creationId xmlns:a16="http://schemas.microsoft.com/office/drawing/2014/main" xmlns="" id="{50D518AA-415E-4B9E-B6CE-3D9512DC8A23}"/>
+                <a16:creationId xmlns="" xmlns:a16="http://schemas.microsoft.com/office/drawing/2014/main" id="{50D518AA-415E-4B9E-B6CE-3D9512DC8A23}"/>
               </a:ext>
             </a:extLst>
           </p:cNvPr>
@@ -3017,7 +3017,7 @@
           <p:cNvPr id="3" name="Рисунок 2">
             <a:extLst>
               <a:ext uri="{FF2B5EF4-FFF2-40B4-BE49-F238E27FC236}">
-                <a16:creationId xmlns:a16="http://schemas.microsoft.com/office/drawing/2014/main" xmlns="" id="{A0757C97-FB6D-45E9-86D6-4D17B9E46928}"/>
+                <a16:creationId xmlns="" xmlns:a16="http://schemas.microsoft.com/office/drawing/2014/main" id="{A0757C97-FB6D-45E9-86D6-4D17B9E46928}"/>
               </a:ext>
             </a:extLst>
           </p:cNvPr>
@@ -3088,7 +3088,7 @@
           <p:cNvPr id="4" name="Текст 3">
             <a:extLst>
               <a:ext uri="{FF2B5EF4-FFF2-40B4-BE49-F238E27FC236}">
-                <a16:creationId xmlns:a16="http://schemas.microsoft.com/office/drawing/2014/main" xmlns="" id="{A47D716E-729A-4CEE-A527-D5A88DC2C4E7}"/>
+                <a16:creationId xmlns="" xmlns:a16="http://schemas.microsoft.com/office/drawing/2014/main" id="{A47D716E-729A-4CEE-A527-D5A88DC2C4E7}"/>
               </a:ext>
             </a:extLst>
           </p:cNvPr>
@@ -3159,7 +3159,7 @@
           <p:cNvPr id="5" name="Дата 4">
             <a:extLst>
               <a:ext uri="{FF2B5EF4-FFF2-40B4-BE49-F238E27FC236}">
-                <a16:creationId xmlns:a16="http://schemas.microsoft.com/office/drawing/2014/main" xmlns="" id="{BE5531C1-0989-42F3-8B55-ED2B6369320F}"/>
+                <a16:creationId xmlns="" xmlns:a16="http://schemas.microsoft.com/office/drawing/2014/main" id="{BE5531C1-0989-42F3-8B55-ED2B6369320F}"/>
               </a:ext>
             </a:extLst>
           </p:cNvPr>
@@ -3177,7 +3177,7 @@
           <a:p>
             <a:fld id="{179F325E-E7A8-4C2D-A5CC-333F2160F8C7}" type="datetimeFigureOut">
               <a:rPr lang="ru-RU" smtClean="0"/>
-              <a:t>07.12.2021</a:t>
+              <a:t>12.12.2021</a:t>
             </a:fld>
             <a:endParaRPr lang="ru-RU"/>
           </a:p>
@@ -3188,7 +3188,7 @@
           <p:cNvPr id="6" name="Нижний колонтитул 5">
             <a:extLst>
               <a:ext uri="{FF2B5EF4-FFF2-40B4-BE49-F238E27FC236}">
-                <a16:creationId xmlns:a16="http://schemas.microsoft.com/office/drawing/2014/main" xmlns="" id="{B7A5DC33-81AA-4C8B-9524-D9DBAF26C9B5}"/>
+                <a16:creationId xmlns="" xmlns:a16="http://schemas.microsoft.com/office/drawing/2014/main" id="{B7A5DC33-81AA-4C8B-9524-D9DBAF26C9B5}"/>
               </a:ext>
             </a:extLst>
           </p:cNvPr>
@@ -3213,7 +3213,7 @@
           <p:cNvPr id="7" name="Номер слайда 6">
             <a:extLst>
               <a:ext uri="{FF2B5EF4-FFF2-40B4-BE49-F238E27FC236}">
-                <a16:creationId xmlns:a16="http://schemas.microsoft.com/office/drawing/2014/main" xmlns="" id="{742AD5DE-476C-4848-A5E6-177BF17CC305}"/>
+                <a16:creationId xmlns="" xmlns:a16="http://schemas.microsoft.com/office/drawing/2014/main" id="{742AD5DE-476C-4848-A5E6-177BF17CC305}"/>
               </a:ext>
             </a:extLst>
           </p:cNvPr>
@@ -3277,7 +3277,7 @@
           <p:cNvPr id="8" name="Рисунок 7">
             <a:extLst>
               <a:ext uri="{FF2B5EF4-FFF2-40B4-BE49-F238E27FC236}">
-                <a16:creationId xmlns:a16="http://schemas.microsoft.com/office/drawing/2014/main" xmlns="" id="{85B0211F-5DAB-494F-AF3E-16B93A60ABC0}"/>
+                <a16:creationId xmlns="" xmlns:a16="http://schemas.microsoft.com/office/drawing/2014/main" id="{85B0211F-5DAB-494F-AF3E-16B93A60ABC0}"/>
               </a:ext>
             </a:extLst>
           </p:cNvPr>
@@ -3313,7 +3313,7 @@
           <p:cNvPr id="2" name="Заголовок 1">
             <a:extLst>
               <a:ext uri="{FF2B5EF4-FFF2-40B4-BE49-F238E27FC236}">
-                <a16:creationId xmlns:a16="http://schemas.microsoft.com/office/drawing/2014/main" xmlns="" id="{433A4367-D87A-4656-9B82-E7F93FA25C78}"/>
+                <a16:creationId xmlns="" xmlns:a16="http://schemas.microsoft.com/office/drawing/2014/main" id="{433A4367-D87A-4656-9B82-E7F93FA25C78}"/>
               </a:ext>
             </a:extLst>
           </p:cNvPr>
@@ -3351,7 +3351,7 @@
           <p:cNvPr id="3" name="Текст 2">
             <a:extLst>
               <a:ext uri="{FF2B5EF4-FFF2-40B4-BE49-F238E27FC236}">
-                <a16:creationId xmlns:a16="http://schemas.microsoft.com/office/drawing/2014/main" xmlns="" id="{50BF2EBB-B7FB-4F01-8B69-0598994E4F4E}"/>
+                <a16:creationId xmlns="" xmlns:a16="http://schemas.microsoft.com/office/drawing/2014/main" id="{50BF2EBB-B7FB-4F01-8B69-0598994E4F4E}"/>
               </a:ext>
             </a:extLst>
           </p:cNvPr>
@@ -3418,7 +3418,7 @@
           <p:cNvPr id="4" name="Дата 3">
             <a:extLst>
               <a:ext uri="{FF2B5EF4-FFF2-40B4-BE49-F238E27FC236}">
-                <a16:creationId xmlns:a16="http://schemas.microsoft.com/office/drawing/2014/main" xmlns="" id="{3E4841F7-36A3-4C94-A4C4-CB9E46D09750}"/>
+                <a16:creationId xmlns="" xmlns:a16="http://schemas.microsoft.com/office/drawing/2014/main" id="{3E4841F7-36A3-4C94-A4C4-CB9E46D09750}"/>
               </a:ext>
             </a:extLst>
           </p:cNvPr>
@@ -3454,7 +3454,7 @@
           <a:p>
             <a:fld id="{179F325E-E7A8-4C2D-A5CC-333F2160F8C7}" type="datetimeFigureOut">
               <a:rPr lang="ru-RU" smtClean="0"/>
-              <a:t>07.12.2021</a:t>
+              <a:t>12.12.2021</a:t>
             </a:fld>
             <a:endParaRPr lang="ru-RU"/>
           </a:p>
@@ -3465,7 +3465,7 @@
           <p:cNvPr id="5" name="Нижний колонтитул 4">
             <a:extLst>
               <a:ext uri="{FF2B5EF4-FFF2-40B4-BE49-F238E27FC236}">
-                <a16:creationId xmlns:a16="http://schemas.microsoft.com/office/drawing/2014/main" xmlns="" id="{87915597-1FA5-476A-9CF9-902C4952C809}"/>
+                <a16:creationId xmlns="" xmlns:a16="http://schemas.microsoft.com/office/drawing/2014/main" id="{87915597-1FA5-476A-9CF9-902C4952C809}"/>
               </a:ext>
             </a:extLst>
           </p:cNvPr>
@@ -3508,7 +3508,7 @@
           <p:cNvPr id="6" name="Номер слайда 5">
             <a:extLst>
               <a:ext uri="{FF2B5EF4-FFF2-40B4-BE49-F238E27FC236}">
-                <a16:creationId xmlns:a16="http://schemas.microsoft.com/office/drawing/2014/main" xmlns="" id="{E5B2BF89-047B-45E4-8349-A678D5B0377E}"/>
+                <a16:creationId xmlns="" xmlns:a16="http://schemas.microsoft.com/office/drawing/2014/main" id="{E5B2BF89-047B-45E4-8349-A678D5B0377E}"/>
               </a:ext>
             </a:extLst>
           </p:cNvPr>
@@ -3968,7 +3968,7 @@
         </p:nvSpPr>
         <p:spPr>
           <a:xfrm>
-            <a:off x="652733" y="4412921"/>
+            <a:off x="523337" y="3931249"/>
             <a:ext cx="9144000" cy="1655762"/>
           </a:xfrm>
         </p:spPr>

</xml_diff>